<commit_message>
doc: update notes pptx
</commit_message>
<xml_diff>
--- a/notes.pptx
+++ b/notes.pptx
@@ -30,7 +30,10 @@
     <p:sldId id="1002" r:id="rId24"/>
     <p:sldId id="1003" r:id="rId25"/>
     <p:sldId id="1004" r:id="rId26"/>
-    <p:sldId id="259" r:id="rId27"/>
+    <p:sldId id="1005" r:id="rId27"/>
+    <p:sldId id="1006" r:id="rId28"/>
+    <p:sldId id="1007" r:id="rId29"/>
+    <p:sldId id="259" r:id="rId30"/>
   </p:sldIdLst>
   <p:sldSz cx="12192000" cy="6858000"/>
   <p:notesSz cx="6858000" cy="9144000"/>
@@ -286,7 +289,7 @@
           <a:p>
             <a:fld id="{CAE47142-16B0-4769-BA42-4A01FDA2F14A}" type="datetimeFigureOut">
               <a:rPr lang="fr-FR" smtClean="0"/>
-              <a:t>18/10/2021</a:t>
+              <a:t>04/01/2022</a:t>
             </a:fld>
             <a:endParaRPr lang="fr-FR"/>
           </a:p>
@@ -486,7 +489,7 @@
           <a:p>
             <a:fld id="{CAE47142-16B0-4769-BA42-4A01FDA2F14A}" type="datetimeFigureOut">
               <a:rPr lang="fr-FR" smtClean="0"/>
-              <a:t>18/10/2021</a:t>
+              <a:t>04/01/2022</a:t>
             </a:fld>
             <a:endParaRPr lang="fr-FR"/>
           </a:p>
@@ -696,7 +699,7 @@
           <a:p>
             <a:fld id="{CAE47142-16B0-4769-BA42-4A01FDA2F14A}" type="datetimeFigureOut">
               <a:rPr lang="fr-FR" smtClean="0"/>
-              <a:t>18/10/2021</a:t>
+              <a:t>04/01/2022</a:t>
             </a:fld>
             <a:endParaRPr lang="fr-FR"/>
           </a:p>
@@ -896,7 +899,7 @@
           <a:p>
             <a:fld id="{CAE47142-16B0-4769-BA42-4A01FDA2F14A}" type="datetimeFigureOut">
               <a:rPr lang="fr-FR" smtClean="0"/>
-              <a:t>18/10/2021</a:t>
+              <a:t>04/01/2022</a:t>
             </a:fld>
             <a:endParaRPr lang="fr-FR"/>
           </a:p>
@@ -1172,7 +1175,7 @@
           <a:p>
             <a:fld id="{CAE47142-16B0-4769-BA42-4A01FDA2F14A}" type="datetimeFigureOut">
               <a:rPr lang="fr-FR" smtClean="0"/>
-              <a:t>18/10/2021</a:t>
+              <a:t>04/01/2022</a:t>
             </a:fld>
             <a:endParaRPr lang="fr-FR"/>
           </a:p>
@@ -1440,7 +1443,7 @@
           <a:p>
             <a:fld id="{CAE47142-16B0-4769-BA42-4A01FDA2F14A}" type="datetimeFigureOut">
               <a:rPr lang="fr-FR" smtClean="0"/>
-              <a:t>18/10/2021</a:t>
+              <a:t>04/01/2022</a:t>
             </a:fld>
             <a:endParaRPr lang="fr-FR"/>
           </a:p>
@@ -1855,7 +1858,7 @@
           <a:p>
             <a:fld id="{CAE47142-16B0-4769-BA42-4A01FDA2F14A}" type="datetimeFigureOut">
               <a:rPr lang="fr-FR" smtClean="0"/>
-              <a:t>18/10/2021</a:t>
+              <a:t>04/01/2022</a:t>
             </a:fld>
             <a:endParaRPr lang="fr-FR"/>
           </a:p>
@@ -1997,7 +2000,7 @@
           <a:p>
             <a:fld id="{CAE47142-16B0-4769-BA42-4A01FDA2F14A}" type="datetimeFigureOut">
               <a:rPr lang="fr-FR" smtClean="0"/>
-              <a:t>18/10/2021</a:t>
+              <a:t>04/01/2022</a:t>
             </a:fld>
             <a:endParaRPr lang="fr-FR"/>
           </a:p>
@@ -2110,7 +2113,7 @@
           <a:p>
             <a:fld id="{CAE47142-16B0-4769-BA42-4A01FDA2F14A}" type="datetimeFigureOut">
               <a:rPr lang="fr-FR" smtClean="0"/>
-              <a:t>18/10/2021</a:t>
+              <a:t>04/01/2022</a:t>
             </a:fld>
             <a:endParaRPr lang="fr-FR"/>
           </a:p>
@@ -2423,7 +2426,7 @@
           <a:p>
             <a:fld id="{CAE47142-16B0-4769-BA42-4A01FDA2F14A}" type="datetimeFigureOut">
               <a:rPr lang="fr-FR" smtClean="0"/>
-              <a:t>18/10/2021</a:t>
+              <a:t>04/01/2022</a:t>
             </a:fld>
             <a:endParaRPr lang="fr-FR"/>
           </a:p>
@@ -2712,7 +2715,7 @@
           <a:p>
             <a:fld id="{CAE47142-16B0-4769-BA42-4A01FDA2F14A}" type="datetimeFigureOut">
               <a:rPr lang="fr-FR" smtClean="0"/>
-              <a:t>18/10/2021</a:t>
+              <a:t>04/01/2022</a:t>
             </a:fld>
             <a:endParaRPr lang="fr-FR"/>
           </a:p>
@@ -2955,7 +2958,7 @@
           <a:p>
             <a:fld id="{CAE47142-16B0-4769-BA42-4A01FDA2F14A}" type="datetimeFigureOut">
               <a:rPr lang="fr-FR" smtClean="0"/>
-              <a:t>18/10/2021</a:t>
+              <a:t>04/01/2022</a:t>
             </a:fld>
             <a:endParaRPr lang="fr-FR"/>
           </a:p>
@@ -15970,6 +15973,2211 @@
           <p:cNvPr id="2" name="Title 1">
             <a:extLst>
               <a:ext uri="{FF2B5EF4-FFF2-40B4-BE49-F238E27FC236}">
+                <a16:creationId xmlns:a16="http://schemas.microsoft.com/office/drawing/2014/main" id="{34B82C23-F2F5-47C2-83E4-1B8120ABEFA7}"/>
+              </a:ext>
+            </a:extLst>
+          </p:cNvPr>
+          <p:cNvSpPr>
+            <a:spLocks noGrp="1"/>
+          </p:cNvSpPr>
+          <p:nvPr>
+            <p:ph type="title"/>
+          </p:nvPr>
+        </p:nvSpPr>
+        <p:spPr/>
+        <p:txBody>
+          <a:bodyPr/>
+          <a:lstStyle/>
+          <a:p>
+            <a:r>
+              <a:rPr lang="fr-FR" dirty="0"/>
+              <a:t>librairie</a:t>
+            </a:r>
+          </a:p>
+        </p:txBody>
+      </p:sp>
+      <p:cxnSp>
+        <p:nvCxnSpPr>
+          <p:cNvPr id="5" name="Straight Arrow Connector 4">
+            <a:extLst>
+              <a:ext uri="{FF2B5EF4-FFF2-40B4-BE49-F238E27FC236}">
+                <a16:creationId xmlns:a16="http://schemas.microsoft.com/office/drawing/2014/main" id="{DAE3CC0A-6625-403A-8F29-6890A8902207}"/>
+              </a:ext>
+            </a:extLst>
+          </p:cNvPr>
+          <p:cNvCxnSpPr/>
+          <p:nvPr/>
+        </p:nvCxnSpPr>
+        <p:spPr>
+          <a:xfrm flipV="1">
+            <a:off x="1246094" y="1775012"/>
+            <a:ext cx="0" cy="4208929"/>
+          </a:xfrm>
+          <a:prstGeom prst="straightConnector1">
+            <a:avLst/>
+          </a:prstGeom>
+          <a:ln w="76200">
+            <a:solidFill>
+              <a:schemeClr val="accent1"/>
+            </a:solidFill>
+            <a:tailEnd type="triangle"/>
+          </a:ln>
+        </p:spPr>
+        <p:style>
+          <a:lnRef idx="1">
+            <a:schemeClr val="accent1"/>
+          </a:lnRef>
+          <a:fillRef idx="0">
+            <a:schemeClr val="accent1"/>
+          </a:fillRef>
+          <a:effectRef idx="0">
+            <a:schemeClr val="accent1"/>
+          </a:effectRef>
+          <a:fontRef idx="minor">
+            <a:schemeClr val="tx1"/>
+          </a:fontRef>
+        </p:style>
+      </p:cxnSp>
+      <p:cxnSp>
+        <p:nvCxnSpPr>
+          <p:cNvPr id="7" name="Straight Arrow Connector 6">
+            <a:extLst>
+              <a:ext uri="{FF2B5EF4-FFF2-40B4-BE49-F238E27FC236}">
+                <a16:creationId xmlns:a16="http://schemas.microsoft.com/office/drawing/2014/main" id="{DF0D8D53-B484-401F-A781-0E7C5A7B390E}"/>
+              </a:ext>
+            </a:extLst>
+          </p:cNvPr>
+          <p:cNvCxnSpPr/>
+          <p:nvPr/>
+        </p:nvCxnSpPr>
+        <p:spPr>
+          <a:xfrm>
+            <a:off x="753035" y="5540188"/>
+            <a:ext cx="9094694" cy="0"/>
+          </a:xfrm>
+          <a:prstGeom prst="straightConnector1">
+            <a:avLst/>
+          </a:prstGeom>
+          <a:ln w="76200">
+            <a:solidFill>
+              <a:schemeClr val="accent1"/>
+            </a:solidFill>
+            <a:tailEnd type="triangle"/>
+          </a:ln>
+        </p:spPr>
+        <p:style>
+          <a:lnRef idx="1">
+            <a:schemeClr val="accent1"/>
+          </a:lnRef>
+          <a:fillRef idx="0">
+            <a:schemeClr val="accent1"/>
+          </a:fillRef>
+          <a:effectRef idx="0">
+            <a:schemeClr val="accent1"/>
+          </a:effectRef>
+          <a:fontRef idx="minor">
+            <a:schemeClr val="tx1"/>
+          </a:fontRef>
+        </p:style>
+      </p:cxnSp>
+      <p:sp>
+        <p:nvSpPr>
+          <p:cNvPr id="8" name="TextBox 7">
+            <a:extLst>
+              <a:ext uri="{FF2B5EF4-FFF2-40B4-BE49-F238E27FC236}">
+                <a16:creationId xmlns:a16="http://schemas.microsoft.com/office/drawing/2014/main" id="{A2F15CCE-4E0E-46AC-9EF5-7282043E2B33}"/>
+              </a:ext>
+            </a:extLst>
+          </p:cNvPr>
+          <p:cNvSpPr txBox="1"/>
+          <p:nvPr/>
+        </p:nvSpPr>
+        <p:spPr>
+          <a:xfrm>
+            <a:off x="8892988" y="5903259"/>
+            <a:ext cx="769313" cy="369332"/>
+          </a:xfrm>
+          <a:prstGeom prst="rect">
+            <a:avLst/>
+          </a:prstGeom>
+          <a:noFill/>
+        </p:spPr>
+        <p:txBody>
+          <a:bodyPr wrap="none" rtlCol="0">
+            <a:spAutoFit/>
+          </a:bodyPr>
+          <a:lstStyle/>
+          <a:p>
+            <a:r>
+              <a:rPr lang="fr-FR" dirty="0"/>
+              <a:t>temps</a:t>
+            </a:r>
+          </a:p>
+        </p:txBody>
+      </p:sp>
+      <p:sp>
+        <p:nvSpPr>
+          <p:cNvPr id="9" name="TextBox 8">
+            <a:extLst>
+              <a:ext uri="{FF2B5EF4-FFF2-40B4-BE49-F238E27FC236}">
+                <a16:creationId xmlns:a16="http://schemas.microsoft.com/office/drawing/2014/main" id="{7DBD21A9-110F-4B6C-A189-CD631A13C521}"/>
+              </a:ext>
+            </a:extLst>
+          </p:cNvPr>
+          <p:cNvSpPr txBox="1"/>
+          <p:nvPr/>
+        </p:nvSpPr>
+        <p:spPr>
+          <a:xfrm>
+            <a:off x="340659" y="1492624"/>
+            <a:ext cx="1334276" cy="369332"/>
+          </a:xfrm>
+          <a:prstGeom prst="rect">
+            <a:avLst/>
+          </a:prstGeom>
+          <a:noFill/>
+        </p:spPr>
+        <p:txBody>
+          <a:bodyPr wrap="none" rtlCol="0">
+            <a:spAutoFit/>
+          </a:bodyPr>
+          <a:lstStyle/>
+          <a:p>
+            <a:r>
+              <a:rPr lang="fr-FR" dirty="0"/>
+              <a:t>avancement</a:t>
+            </a:r>
+          </a:p>
+        </p:txBody>
+      </p:sp>
+      <p:cxnSp>
+        <p:nvCxnSpPr>
+          <p:cNvPr id="11" name="Straight Connector 10">
+            <a:extLst>
+              <a:ext uri="{FF2B5EF4-FFF2-40B4-BE49-F238E27FC236}">
+                <a16:creationId xmlns:a16="http://schemas.microsoft.com/office/drawing/2014/main" id="{1BAAC1CB-0433-4B5E-B5C2-8D4AA7755790}"/>
+              </a:ext>
+            </a:extLst>
+          </p:cNvPr>
+          <p:cNvCxnSpPr>
+            <a:cxnSpLocks/>
+          </p:cNvCxnSpPr>
+          <p:nvPr/>
+        </p:nvCxnSpPr>
+        <p:spPr>
+          <a:xfrm flipV="1">
+            <a:off x="1246094" y="3944471"/>
+            <a:ext cx="690282" cy="1546412"/>
+          </a:xfrm>
+          <a:prstGeom prst="line">
+            <a:avLst/>
+          </a:prstGeom>
+          <a:ln w="76200">
+            <a:solidFill>
+              <a:schemeClr val="accent1"/>
+            </a:solidFill>
+          </a:ln>
+        </p:spPr>
+        <p:style>
+          <a:lnRef idx="1">
+            <a:schemeClr val="accent1"/>
+          </a:lnRef>
+          <a:fillRef idx="0">
+            <a:schemeClr val="accent1"/>
+          </a:fillRef>
+          <a:effectRef idx="0">
+            <a:schemeClr val="accent1"/>
+          </a:effectRef>
+          <a:fontRef idx="minor">
+            <a:schemeClr val="tx1"/>
+          </a:fontRef>
+        </p:style>
+      </p:cxnSp>
+      <p:cxnSp>
+        <p:nvCxnSpPr>
+          <p:cNvPr id="15" name="Straight Connector 14">
+            <a:extLst>
+              <a:ext uri="{FF2B5EF4-FFF2-40B4-BE49-F238E27FC236}">
+                <a16:creationId xmlns:a16="http://schemas.microsoft.com/office/drawing/2014/main" id="{27B0DD1C-9A45-437F-AFD5-981917B5DAF6}"/>
+              </a:ext>
+            </a:extLst>
+          </p:cNvPr>
+          <p:cNvCxnSpPr>
+            <a:cxnSpLocks/>
+          </p:cNvCxnSpPr>
+          <p:nvPr/>
+        </p:nvCxnSpPr>
+        <p:spPr>
+          <a:xfrm flipV="1">
+            <a:off x="1911724" y="2690762"/>
+            <a:ext cx="8162365" cy="1253708"/>
+          </a:xfrm>
+          <a:prstGeom prst="line">
+            <a:avLst/>
+          </a:prstGeom>
+          <a:ln w="76200">
+            <a:solidFill>
+              <a:schemeClr val="accent1"/>
+            </a:solidFill>
+          </a:ln>
+        </p:spPr>
+        <p:style>
+          <a:lnRef idx="1">
+            <a:schemeClr val="accent1"/>
+          </a:lnRef>
+          <a:fillRef idx="0">
+            <a:schemeClr val="accent1"/>
+          </a:fillRef>
+          <a:effectRef idx="0">
+            <a:schemeClr val="accent1"/>
+          </a:effectRef>
+          <a:fontRef idx="minor">
+            <a:schemeClr val="tx1"/>
+          </a:fontRef>
+        </p:style>
+      </p:cxnSp>
+      <p:cxnSp>
+        <p:nvCxnSpPr>
+          <p:cNvPr id="20" name="Straight Connector 19">
+            <a:extLst>
+              <a:ext uri="{FF2B5EF4-FFF2-40B4-BE49-F238E27FC236}">
+                <a16:creationId xmlns:a16="http://schemas.microsoft.com/office/drawing/2014/main" id="{DD9B9498-3079-4FD2-8546-7B31D1AF0348}"/>
+              </a:ext>
+            </a:extLst>
+          </p:cNvPr>
+          <p:cNvCxnSpPr>
+            <a:cxnSpLocks/>
+          </p:cNvCxnSpPr>
+          <p:nvPr/>
+        </p:nvCxnSpPr>
+        <p:spPr>
+          <a:xfrm flipV="1">
+            <a:off x="1246093" y="2169459"/>
+            <a:ext cx="4746813" cy="3370729"/>
+          </a:xfrm>
+          <a:prstGeom prst="line">
+            <a:avLst/>
+          </a:prstGeom>
+          <a:ln w="76200">
+            <a:solidFill>
+              <a:schemeClr val="accent1"/>
+            </a:solidFill>
+          </a:ln>
+        </p:spPr>
+        <p:style>
+          <a:lnRef idx="1">
+            <a:schemeClr val="accent1"/>
+          </a:lnRef>
+          <a:fillRef idx="0">
+            <a:schemeClr val="accent1"/>
+          </a:fillRef>
+          <a:effectRef idx="0">
+            <a:schemeClr val="accent1"/>
+          </a:effectRef>
+          <a:fontRef idx="minor">
+            <a:schemeClr val="tx1"/>
+          </a:fontRef>
+        </p:style>
+      </p:cxnSp>
+      <p:cxnSp>
+        <p:nvCxnSpPr>
+          <p:cNvPr id="22" name="Straight Connector 21">
+            <a:extLst>
+              <a:ext uri="{FF2B5EF4-FFF2-40B4-BE49-F238E27FC236}">
+                <a16:creationId xmlns:a16="http://schemas.microsoft.com/office/drawing/2014/main" id="{3E3086E6-679C-404F-BAA6-8F45708EFDE9}"/>
+              </a:ext>
+            </a:extLst>
+          </p:cNvPr>
+          <p:cNvCxnSpPr>
+            <a:cxnSpLocks/>
+          </p:cNvCxnSpPr>
+          <p:nvPr/>
+        </p:nvCxnSpPr>
+        <p:spPr>
+          <a:xfrm flipV="1">
+            <a:off x="1178858" y="2447363"/>
+            <a:ext cx="7938248" cy="98614"/>
+          </a:xfrm>
+          <a:prstGeom prst="line">
+            <a:avLst/>
+          </a:prstGeom>
+          <a:ln w="76200">
+            <a:solidFill>
+              <a:schemeClr val="accent1"/>
+            </a:solidFill>
+          </a:ln>
+        </p:spPr>
+        <p:style>
+          <a:lnRef idx="1">
+            <a:schemeClr val="accent1"/>
+          </a:lnRef>
+          <a:fillRef idx="0">
+            <a:schemeClr val="accent1"/>
+          </a:fillRef>
+          <a:effectRef idx="0">
+            <a:schemeClr val="accent1"/>
+          </a:effectRef>
+          <a:fontRef idx="minor">
+            <a:schemeClr val="tx1"/>
+          </a:fontRef>
+        </p:style>
+      </p:cxnSp>
+      <p:cxnSp>
+        <p:nvCxnSpPr>
+          <p:cNvPr id="29" name="Straight Connector 28">
+            <a:extLst>
+              <a:ext uri="{FF2B5EF4-FFF2-40B4-BE49-F238E27FC236}">
+                <a16:creationId xmlns:a16="http://schemas.microsoft.com/office/drawing/2014/main" id="{DF77781D-E932-49A6-BDAD-9899E121442A}"/>
+              </a:ext>
+            </a:extLst>
+          </p:cNvPr>
+          <p:cNvCxnSpPr>
+            <a:cxnSpLocks/>
+          </p:cNvCxnSpPr>
+          <p:nvPr/>
+        </p:nvCxnSpPr>
+        <p:spPr>
+          <a:xfrm flipV="1">
+            <a:off x="1313331" y="4029635"/>
+            <a:ext cx="654422" cy="1281954"/>
+          </a:xfrm>
+          <a:prstGeom prst="line">
+            <a:avLst/>
+          </a:prstGeom>
+          <a:ln w="76200">
+            <a:solidFill>
+              <a:srgbClr val="FFC000"/>
+            </a:solidFill>
+          </a:ln>
+        </p:spPr>
+        <p:style>
+          <a:lnRef idx="1">
+            <a:schemeClr val="accent1"/>
+          </a:lnRef>
+          <a:fillRef idx="0">
+            <a:schemeClr val="accent1"/>
+          </a:fillRef>
+          <a:effectRef idx="0">
+            <a:schemeClr val="accent1"/>
+          </a:effectRef>
+          <a:fontRef idx="minor">
+            <a:schemeClr val="tx1"/>
+          </a:fontRef>
+        </p:style>
+      </p:cxnSp>
+      <p:cxnSp>
+        <p:nvCxnSpPr>
+          <p:cNvPr id="31" name="Straight Connector 30">
+            <a:extLst>
+              <a:ext uri="{FF2B5EF4-FFF2-40B4-BE49-F238E27FC236}">
+                <a16:creationId xmlns:a16="http://schemas.microsoft.com/office/drawing/2014/main" id="{345F629F-8D49-4A82-8BFA-C10685F4F58C}"/>
+              </a:ext>
+            </a:extLst>
+          </p:cNvPr>
+          <p:cNvCxnSpPr>
+            <a:cxnSpLocks/>
+          </p:cNvCxnSpPr>
+          <p:nvPr/>
+        </p:nvCxnSpPr>
+        <p:spPr>
+          <a:xfrm flipV="1">
+            <a:off x="3931024" y="2147046"/>
+            <a:ext cx="1963270" cy="1452284"/>
+          </a:xfrm>
+          <a:prstGeom prst="line">
+            <a:avLst/>
+          </a:prstGeom>
+          <a:ln w="76200">
+            <a:solidFill>
+              <a:srgbClr val="FFC000"/>
+            </a:solidFill>
+          </a:ln>
+        </p:spPr>
+        <p:style>
+          <a:lnRef idx="1">
+            <a:schemeClr val="accent1"/>
+          </a:lnRef>
+          <a:fillRef idx="0">
+            <a:schemeClr val="accent1"/>
+          </a:fillRef>
+          <a:effectRef idx="0">
+            <a:schemeClr val="accent1"/>
+          </a:effectRef>
+          <a:fontRef idx="minor">
+            <a:schemeClr val="tx1"/>
+          </a:fontRef>
+        </p:style>
+      </p:cxnSp>
+      <p:cxnSp>
+        <p:nvCxnSpPr>
+          <p:cNvPr id="32" name="Straight Connector 31">
+            <a:extLst>
+              <a:ext uri="{FF2B5EF4-FFF2-40B4-BE49-F238E27FC236}">
+                <a16:creationId xmlns:a16="http://schemas.microsoft.com/office/drawing/2014/main" id="{2B20FFDB-B05C-4764-8CDB-A8C99F3914F8}"/>
+              </a:ext>
+            </a:extLst>
+          </p:cNvPr>
+          <p:cNvCxnSpPr>
+            <a:cxnSpLocks/>
+          </p:cNvCxnSpPr>
+          <p:nvPr/>
+        </p:nvCxnSpPr>
+        <p:spPr>
+          <a:xfrm flipV="1">
+            <a:off x="1967753" y="3666565"/>
+            <a:ext cx="1963271" cy="354104"/>
+          </a:xfrm>
+          <a:prstGeom prst="line">
+            <a:avLst/>
+          </a:prstGeom>
+          <a:ln w="76200">
+            <a:solidFill>
+              <a:srgbClr val="FFC000"/>
+            </a:solidFill>
+          </a:ln>
+        </p:spPr>
+        <p:style>
+          <a:lnRef idx="1">
+            <a:schemeClr val="accent1"/>
+          </a:lnRef>
+          <a:fillRef idx="0">
+            <a:schemeClr val="accent1"/>
+          </a:fillRef>
+          <a:effectRef idx="0">
+            <a:schemeClr val="accent1"/>
+          </a:effectRef>
+          <a:fontRef idx="minor">
+            <a:schemeClr val="tx1"/>
+          </a:fontRef>
+        </p:style>
+      </p:cxnSp>
+    </p:spTree>
+    <p:extLst>
+      <p:ext uri="{BB962C8B-B14F-4D97-AF65-F5344CB8AC3E}">
+        <p14:creationId xmlns:p14="http://schemas.microsoft.com/office/powerpoint/2010/main" val="3570674537"/>
+      </p:ext>
+    </p:extLst>
+  </p:cSld>
+  <p:clrMapOvr>
+    <a:masterClrMapping/>
+  </p:clrMapOvr>
+</p:sld>
+</file>
+
+<file path=ppt/slides/slide27.xml><?xml version="1.0" encoding="utf-8"?>
+<p:sld xmlns:a="http://schemas.openxmlformats.org/drawingml/2006/main" xmlns:r="http://schemas.openxmlformats.org/officeDocument/2006/relationships" xmlns:p="http://schemas.openxmlformats.org/presentationml/2006/main">
+  <p:cSld>
+    <p:spTree>
+      <p:nvGrpSpPr>
+        <p:cNvPr id="1" name=""/>
+        <p:cNvGrpSpPr/>
+        <p:nvPr/>
+      </p:nvGrpSpPr>
+      <p:grpSpPr>
+        <a:xfrm>
+          <a:off x="0" y="0"/>
+          <a:ext cx="0" cy="0"/>
+          <a:chOff x="0" y="0"/>
+          <a:chExt cx="0" cy="0"/>
+        </a:xfrm>
+      </p:grpSpPr>
+      <p:sp>
+        <p:nvSpPr>
+          <p:cNvPr id="4" name="Rectangle 3">
+            <a:extLst>
+              <a:ext uri="{FF2B5EF4-FFF2-40B4-BE49-F238E27FC236}">
+                <a16:creationId xmlns:a16="http://schemas.microsoft.com/office/drawing/2014/main" id="{12469E36-37ED-458A-ABCE-1FC9ECD689EE}"/>
+              </a:ext>
+            </a:extLst>
+          </p:cNvPr>
+          <p:cNvSpPr/>
+          <p:nvPr/>
+        </p:nvSpPr>
+        <p:spPr>
+          <a:xfrm>
+            <a:off x="3536574" y="1085857"/>
+            <a:ext cx="2810439" cy="2028261"/>
+          </a:xfrm>
+          <a:prstGeom prst="rect">
+            <a:avLst/>
+          </a:prstGeom>
+        </p:spPr>
+        <p:style>
+          <a:lnRef idx="2">
+            <a:schemeClr val="accent5">
+              <a:shade val="50000"/>
+            </a:schemeClr>
+          </a:lnRef>
+          <a:fillRef idx="1">
+            <a:schemeClr val="accent5"/>
+          </a:fillRef>
+          <a:effectRef idx="0">
+            <a:schemeClr val="accent5"/>
+          </a:effectRef>
+          <a:fontRef idx="minor">
+            <a:schemeClr val="lt1"/>
+          </a:fontRef>
+        </p:style>
+        <p:txBody>
+          <a:bodyPr rtlCol="0" anchor="ctr"/>
+          <a:lstStyle/>
+          <a:p>
+            <a:pPr algn="ctr"/>
+            <a:r>
+              <a:rPr lang="fr-FR" dirty="0" err="1"/>
+              <a:t>nginx</a:t>
+            </a:r>
+            <a:endParaRPr lang="fr-FR" dirty="0"/>
+          </a:p>
+        </p:txBody>
+      </p:sp>
+      <p:sp>
+        <p:nvSpPr>
+          <p:cNvPr id="5" name="Rectangle 4">
+            <a:extLst>
+              <a:ext uri="{FF2B5EF4-FFF2-40B4-BE49-F238E27FC236}">
+                <a16:creationId xmlns:a16="http://schemas.microsoft.com/office/drawing/2014/main" id="{AFD4280A-C99A-436B-8B8B-EAD88947BAE6}"/>
+              </a:ext>
+            </a:extLst>
+          </p:cNvPr>
+          <p:cNvSpPr/>
+          <p:nvPr/>
+        </p:nvSpPr>
+        <p:spPr>
+          <a:xfrm>
+            <a:off x="1479208" y="631583"/>
+            <a:ext cx="1735789" cy="793810"/>
+          </a:xfrm>
+          <a:prstGeom prst="rect">
+            <a:avLst/>
+          </a:prstGeom>
+        </p:spPr>
+        <p:style>
+          <a:lnRef idx="2">
+            <a:schemeClr val="accent6">
+              <a:shade val="50000"/>
+            </a:schemeClr>
+          </a:lnRef>
+          <a:fillRef idx="1">
+            <a:schemeClr val="accent6"/>
+          </a:fillRef>
+          <a:effectRef idx="0">
+            <a:schemeClr val="accent6"/>
+          </a:effectRef>
+          <a:fontRef idx="minor">
+            <a:schemeClr val="lt1"/>
+          </a:fontRef>
+        </p:style>
+        <p:txBody>
+          <a:bodyPr rtlCol="0" anchor="ctr"/>
+          <a:lstStyle/>
+          <a:p>
+            <a:pPr algn="ctr"/>
+            <a:r>
+              <a:rPr lang="fr-FR" dirty="0" err="1"/>
+              <a:t>ufw</a:t>
+            </a:r>
+            <a:r>
+              <a:rPr lang="fr-FR" dirty="0"/>
+              <a:t> - </a:t>
+            </a:r>
+            <a:r>
+              <a:rPr lang="fr-FR" dirty="0" err="1"/>
+              <a:t>iptables</a:t>
+            </a:r>
+            <a:endParaRPr lang="fr-FR" dirty="0"/>
+          </a:p>
+          <a:p>
+            <a:pPr algn="ctr"/>
+            <a:r>
+              <a:rPr lang="fr-FR" dirty="0"/>
+              <a:t>(Firewall)</a:t>
+            </a:r>
+          </a:p>
+        </p:txBody>
+      </p:sp>
+      <p:sp>
+        <p:nvSpPr>
+          <p:cNvPr id="6" name="Rectangle 5">
+            <a:extLst>
+              <a:ext uri="{FF2B5EF4-FFF2-40B4-BE49-F238E27FC236}">
+                <a16:creationId xmlns:a16="http://schemas.microsoft.com/office/drawing/2014/main" id="{AE5F1B14-41FE-46A6-AED0-0B03DA413A42}"/>
+              </a:ext>
+            </a:extLst>
+          </p:cNvPr>
+          <p:cNvSpPr/>
+          <p:nvPr/>
+        </p:nvSpPr>
+        <p:spPr>
+          <a:xfrm>
+            <a:off x="8209430" y="4630271"/>
+            <a:ext cx="1994647" cy="1429871"/>
+          </a:xfrm>
+          <a:prstGeom prst="rect">
+            <a:avLst/>
+          </a:prstGeom>
+        </p:spPr>
+        <p:style>
+          <a:lnRef idx="2">
+            <a:schemeClr val="accent3">
+              <a:shade val="50000"/>
+            </a:schemeClr>
+          </a:lnRef>
+          <a:fillRef idx="1">
+            <a:schemeClr val="accent3"/>
+          </a:fillRef>
+          <a:effectRef idx="0">
+            <a:schemeClr val="accent3"/>
+          </a:effectRef>
+          <a:fontRef idx="minor">
+            <a:schemeClr val="lt1"/>
+          </a:fontRef>
+        </p:style>
+        <p:txBody>
+          <a:bodyPr rtlCol="0" anchor="ctr"/>
+          <a:lstStyle/>
+          <a:p>
+            <a:pPr algn="ctr"/>
+            <a:r>
+              <a:rPr lang="fr-FR" dirty="0" err="1"/>
+              <a:t>certbot</a:t>
+            </a:r>
+            <a:endParaRPr lang="fr-FR" dirty="0"/>
+          </a:p>
+        </p:txBody>
+      </p:sp>
+      <p:sp>
+        <p:nvSpPr>
+          <p:cNvPr id="7" name="Rectangle 6">
+            <a:extLst>
+              <a:ext uri="{FF2B5EF4-FFF2-40B4-BE49-F238E27FC236}">
+                <a16:creationId xmlns:a16="http://schemas.microsoft.com/office/drawing/2014/main" id="{4832422D-758A-41F8-A3BA-C22C0E4B6AA4}"/>
+              </a:ext>
+            </a:extLst>
+          </p:cNvPr>
+          <p:cNvSpPr/>
+          <p:nvPr/>
+        </p:nvSpPr>
+        <p:spPr>
+          <a:xfrm>
+            <a:off x="449359" y="1783981"/>
+            <a:ext cx="1351426" cy="632013"/>
+          </a:xfrm>
+          <a:prstGeom prst="rect">
+            <a:avLst/>
+          </a:prstGeom>
+        </p:spPr>
+        <p:style>
+          <a:lnRef idx="2">
+            <a:schemeClr val="dk1">
+              <a:shade val="50000"/>
+            </a:schemeClr>
+          </a:lnRef>
+          <a:fillRef idx="1">
+            <a:schemeClr val="dk1"/>
+          </a:fillRef>
+          <a:effectRef idx="0">
+            <a:schemeClr val="dk1"/>
+          </a:effectRef>
+          <a:fontRef idx="minor">
+            <a:schemeClr val="lt1"/>
+          </a:fontRef>
+        </p:style>
+        <p:txBody>
+          <a:bodyPr rtlCol="0" anchor="ctr"/>
+          <a:lstStyle/>
+          <a:p>
+            <a:pPr algn="ctr"/>
+            <a:r>
+              <a:rPr lang="fr-FR" dirty="0" err="1"/>
+              <a:t>systemd</a:t>
+            </a:r>
+            <a:endParaRPr lang="fr-FR" dirty="0"/>
+          </a:p>
+          <a:p>
+            <a:pPr algn="ctr"/>
+            <a:r>
+              <a:rPr lang="fr-FR" dirty="0"/>
+              <a:t>(</a:t>
+            </a:r>
+            <a:r>
+              <a:rPr lang="fr-FR" dirty="0" err="1"/>
+              <a:t>systemctl</a:t>
+            </a:r>
+            <a:r>
+              <a:rPr lang="fr-FR" dirty="0"/>
+              <a:t>)</a:t>
+            </a:r>
+          </a:p>
+        </p:txBody>
+      </p:sp>
+      <p:sp>
+        <p:nvSpPr>
+          <p:cNvPr id="8" name="Rectangle 7">
+            <a:extLst>
+              <a:ext uri="{FF2B5EF4-FFF2-40B4-BE49-F238E27FC236}">
+                <a16:creationId xmlns:a16="http://schemas.microsoft.com/office/drawing/2014/main" id="{8ACE2AC2-A982-4518-8945-B4BA05F96399}"/>
+              </a:ext>
+            </a:extLst>
+          </p:cNvPr>
+          <p:cNvSpPr/>
+          <p:nvPr/>
+        </p:nvSpPr>
+        <p:spPr>
+          <a:xfrm>
+            <a:off x="661147" y="5103159"/>
+            <a:ext cx="927850" cy="564775"/>
+          </a:xfrm>
+          <a:prstGeom prst="rect">
+            <a:avLst/>
+          </a:prstGeom>
+        </p:spPr>
+        <p:style>
+          <a:lnRef idx="2">
+            <a:schemeClr val="accent2">
+              <a:shade val="50000"/>
+            </a:schemeClr>
+          </a:lnRef>
+          <a:fillRef idx="1">
+            <a:schemeClr val="accent2"/>
+          </a:fillRef>
+          <a:effectRef idx="0">
+            <a:schemeClr val="accent2"/>
+          </a:effectRef>
+          <a:fontRef idx="minor">
+            <a:schemeClr val="lt1"/>
+          </a:fontRef>
+        </p:style>
+        <p:txBody>
+          <a:bodyPr rtlCol="0" anchor="ctr"/>
+          <a:lstStyle/>
+          <a:p>
+            <a:pPr algn="ctr"/>
+            <a:r>
+              <a:rPr lang="fr-FR" dirty="0" err="1"/>
+              <a:t>crontab</a:t>
+            </a:r>
+            <a:endParaRPr lang="fr-FR" dirty="0"/>
+          </a:p>
+        </p:txBody>
+      </p:sp>
+      <p:cxnSp>
+        <p:nvCxnSpPr>
+          <p:cNvPr id="10" name="Straight Arrow Connector 9">
+            <a:extLst>
+              <a:ext uri="{FF2B5EF4-FFF2-40B4-BE49-F238E27FC236}">
+                <a16:creationId xmlns:a16="http://schemas.microsoft.com/office/drawing/2014/main" id="{53ACA18C-0972-4D2F-8481-AA2458DBB1DA}"/>
+              </a:ext>
+            </a:extLst>
+          </p:cNvPr>
+          <p:cNvCxnSpPr>
+            <a:cxnSpLocks/>
+            <a:stCxn id="7" idx="3"/>
+            <a:endCxn id="4" idx="1"/>
+          </p:cNvCxnSpPr>
+          <p:nvPr/>
+        </p:nvCxnSpPr>
+        <p:spPr>
+          <a:xfrm>
+            <a:off x="1800785" y="2099988"/>
+            <a:ext cx="1735789" cy="0"/>
+          </a:xfrm>
+          <a:prstGeom prst="straightConnector1">
+            <a:avLst/>
+          </a:prstGeom>
+          <a:ln w="76200">
+            <a:solidFill>
+              <a:schemeClr val="accent1"/>
+            </a:solidFill>
+            <a:tailEnd type="triangle"/>
+          </a:ln>
+        </p:spPr>
+        <p:style>
+          <a:lnRef idx="1">
+            <a:schemeClr val="accent1"/>
+          </a:lnRef>
+          <a:fillRef idx="0">
+            <a:schemeClr val="accent1"/>
+          </a:fillRef>
+          <a:effectRef idx="0">
+            <a:schemeClr val="accent1"/>
+          </a:effectRef>
+          <a:fontRef idx="minor">
+            <a:schemeClr val="tx1"/>
+          </a:fontRef>
+        </p:style>
+      </p:cxnSp>
+      <p:cxnSp>
+        <p:nvCxnSpPr>
+          <p:cNvPr id="12" name="Straight Arrow Connector 11">
+            <a:extLst>
+              <a:ext uri="{FF2B5EF4-FFF2-40B4-BE49-F238E27FC236}">
+                <a16:creationId xmlns:a16="http://schemas.microsoft.com/office/drawing/2014/main" id="{069D0BEF-8C06-4FCB-9294-0606C4A77B3C}"/>
+              </a:ext>
+            </a:extLst>
+          </p:cNvPr>
+          <p:cNvCxnSpPr>
+            <a:cxnSpLocks/>
+            <a:stCxn id="7" idx="2"/>
+            <a:endCxn id="8" idx="0"/>
+          </p:cNvCxnSpPr>
+          <p:nvPr/>
+        </p:nvCxnSpPr>
+        <p:spPr>
+          <a:xfrm>
+            <a:off x="1125072" y="2415994"/>
+            <a:ext cx="0" cy="2687165"/>
+          </a:xfrm>
+          <a:prstGeom prst="straightConnector1">
+            <a:avLst/>
+          </a:prstGeom>
+          <a:ln w="76200">
+            <a:solidFill>
+              <a:schemeClr val="accent1"/>
+            </a:solidFill>
+            <a:tailEnd type="triangle"/>
+          </a:ln>
+        </p:spPr>
+        <p:style>
+          <a:lnRef idx="1">
+            <a:schemeClr val="accent1"/>
+          </a:lnRef>
+          <a:fillRef idx="0">
+            <a:schemeClr val="accent1"/>
+          </a:fillRef>
+          <a:effectRef idx="0">
+            <a:schemeClr val="accent1"/>
+          </a:effectRef>
+          <a:fontRef idx="minor">
+            <a:schemeClr val="tx1"/>
+          </a:fontRef>
+        </p:style>
+      </p:cxnSp>
+      <p:cxnSp>
+        <p:nvCxnSpPr>
+          <p:cNvPr id="14" name="Straight Arrow Connector 13">
+            <a:extLst>
+              <a:ext uri="{FF2B5EF4-FFF2-40B4-BE49-F238E27FC236}">
+                <a16:creationId xmlns:a16="http://schemas.microsoft.com/office/drawing/2014/main" id="{17AD6FDC-3361-42E7-9EC0-55B99E51A1B9}"/>
+              </a:ext>
+            </a:extLst>
+          </p:cNvPr>
+          <p:cNvCxnSpPr>
+            <a:cxnSpLocks/>
+            <a:stCxn id="8" idx="3"/>
+            <a:endCxn id="6" idx="1"/>
+          </p:cNvCxnSpPr>
+          <p:nvPr/>
+        </p:nvCxnSpPr>
+        <p:spPr>
+          <a:xfrm flipV="1">
+            <a:off x="1588997" y="5345207"/>
+            <a:ext cx="6620433" cy="40340"/>
+          </a:xfrm>
+          <a:prstGeom prst="straightConnector1">
+            <a:avLst/>
+          </a:prstGeom>
+          <a:ln w="76200">
+            <a:solidFill>
+              <a:schemeClr val="accent1"/>
+            </a:solidFill>
+            <a:tailEnd type="triangle"/>
+          </a:ln>
+        </p:spPr>
+        <p:style>
+          <a:lnRef idx="1">
+            <a:schemeClr val="accent1"/>
+          </a:lnRef>
+          <a:fillRef idx="0">
+            <a:schemeClr val="accent1"/>
+          </a:fillRef>
+          <a:effectRef idx="0">
+            <a:schemeClr val="accent1"/>
+          </a:effectRef>
+          <a:fontRef idx="minor">
+            <a:schemeClr val="tx1"/>
+          </a:fontRef>
+        </p:style>
+      </p:cxnSp>
+      <p:cxnSp>
+        <p:nvCxnSpPr>
+          <p:cNvPr id="17" name="Straight Arrow Connector 16">
+            <a:extLst>
+              <a:ext uri="{FF2B5EF4-FFF2-40B4-BE49-F238E27FC236}">
+                <a16:creationId xmlns:a16="http://schemas.microsoft.com/office/drawing/2014/main" id="{53FB01E7-11DC-4DEA-A8FD-AFB1E5BD7CC8}"/>
+              </a:ext>
+            </a:extLst>
+          </p:cNvPr>
+          <p:cNvCxnSpPr>
+            <a:cxnSpLocks/>
+            <a:stCxn id="6" idx="0"/>
+            <a:endCxn id="81" idx="2"/>
+          </p:cNvCxnSpPr>
+          <p:nvPr/>
+        </p:nvCxnSpPr>
+        <p:spPr>
+          <a:xfrm flipH="1" flipV="1">
+            <a:off x="9206753" y="2483269"/>
+            <a:ext cx="1" cy="2147002"/>
+          </a:xfrm>
+          <a:prstGeom prst="straightConnector1">
+            <a:avLst/>
+          </a:prstGeom>
+          <a:ln w="76200">
+            <a:solidFill>
+              <a:schemeClr val="accent1"/>
+            </a:solidFill>
+            <a:tailEnd type="triangle"/>
+          </a:ln>
+        </p:spPr>
+        <p:style>
+          <a:lnRef idx="1">
+            <a:schemeClr val="accent1"/>
+          </a:lnRef>
+          <a:fillRef idx="0">
+            <a:schemeClr val="accent1"/>
+          </a:fillRef>
+          <a:effectRef idx="0">
+            <a:schemeClr val="accent1"/>
+          </a:effectRef>
+          <a:fontRef idx="minor">
+            <a:schemeClr val="tx1"/>
+          </a:fontRef>
+        </p:style>
+      </p:cxnSp>
+      <p:cxnSp>
+        <p:nvCxnSpPr>
+          <p:cNvPr id="21" name="Straight Arrow Connector 20">
+            <a:extLst>
+              <a:ext uri="{FF2B5EF4-FFF2-40B4-BE49-F238E27FC236}">
+                <a16:creationId xmlns:a16="http://schemas.microsoft.com/office/drawing/2014/main" id="{DF7FFC9C-6F35-4449-A085-47D71D823B1E}"/>
+              </a:ext>
+            </a:extLst>
+          </p:cNvPr>
+          <p:cNvCxnSpPr>
+            <a:cxnSpLocks/>
+            <a:stCxn id="81" idx="1"/>
+            <a:endCxn id="4" idx="3"/>
+          </p:cNvCxnSpPr>
+          <p:nvPr/>
+        </p:nvCxnSpPr>
+        <p:spPr>
+          <a:xfrm flipH="1" flipV="1">
+            <a:off x="6347013" y="2099988"/>
+            <a:ext cx="2223771" cy="15708"/>
+          </a:xfrm>
+          <a:prstGeom prst="straightConnector1">
+            <a:avLst/>
+          </a:prstGeom>
+          <a:ln w="76200">
+            <a:solidFill>
+              <a:schemeClr val="accent1"/>
+            </a:solidFill>
+            <a:tailEnd type="triangle"/>
+          </a:ln>
+        </p:spPr>
+        <p:style>
+          <a:lnRef idx="1">
+            <a:schemeClr val="accent1"/>
+          </a:lnRef>
+          <a:fillRef idx="0">
+            <a:schemeClr val="accent1"/>
+          </a:fillRef>
+          <a:effectRef idx="0">
+            <a:schemeClr val="accent1"/>
+          </a:effectRef>
+          <a:fontRef idx="minor">
+            <a:schemeClr val="tx1"/>
+          </a:fontRef>
+        </p:style>
+      </p:cxnSp>
+      <p:cxnSp>
+        <p:nvCxnSpPr>
+          <p:cNvPr id="25" name="Straight Arrow Connector 24">
+            <a:extLst>
+              <a:ext uri="{FF2B5EF4-FFF2-40B4-BE49-F238E27FC236}">
+                <a16:creationId xmlns:a16="http://schemas.microsoft.com/office/drawing/2014/main" id="{87E73063-6A6A-431B-A31C-DF61C9F89C74}"/>
+              </a:ext>
+            </a:extLst>
+          </p:cNvPr>
+          <p:cNvCxnSpPr>
+            <a:cxnSpLocks/>
+            <a:stCxn id="87" idx="0"/>
+            <a:endCxn id="4" idx="2"/>
+          </p:cNvCxnSpPr>
+          <p:nvPr/>
+        </p:nvCxnSpPr>
+        <p:spPr>
+          <a:xfrm flipV="1">
+            <a:off x="4941793" y="3114118"/>
+            <a:ext cx="1" cy="774344"/>
+          </a:xfrm>
+          <a:prstGeom prst="straightConnector1">
+            <a:avLst/>
+          </a:prstGeom>
+          <a:ln w="76200">
+            <a:solidFill>
+              <a:schemeClr val="accent1"/>
+            </a:solidFill>
+            <a:tailEnd type="triangle"/>
+          </a:ln>
+        </p:spPr>
+        <p:style>
+          <a:lnRef idx="1">
+            <a:schemeClr val="accent1"/>
+          </a:lnRef>
+          <a:fillRef idx="0">
+            <a:schemeClr val="accent1"/>
+          </a:fillRef>
+          <a:effectRef idx="0">
+            <a:schemeClr val="accent1"/>
+          </a:effectRef>
+          <a:fontRef idx="minor">
+            <a:schemeClr val="tx1"/>
+          </a:fontRef>
+        </p:style>
+      </p:cxnSp>
+      <p:sp>
+        <p:nvSpPr>
+          <p:cNvPr id="78" name="TextBox 77">
+            <a:extLst>
+              <a:ext uri="{FF2B5EF4-FFF2-40B4-BE49-F238E27FC236}">
+                <a16:creationId xmlns:a16="http://schemas.microsoft.com/office/drawing/2014/main" id="{0BE0093D-B2E4-415D-B12A-B706B14A12CA}"/>
+              </a:ext>
+            </a:extLst>
+          </p:cNvPr>
+          <p:cNvSpPr txBox="1"/>
+          <p:nvPr/>
+        </p:nvSpPr>
+        <p:spPr>
+          <a:xfrm>
+            <a:off x="340659" y="5788959"/>
+            <a:ext cx="2277098" cy="369332"/>
+          </a:xfrm>
+          <a:prstGeom prst="rect">
+            <a:avLst/>
+          </a:prstGeom>
+          <a:noFill/>
+        </p:spPr>
+        <p:txBody>
+          <a:bodyPr wrap="none" rtlCol="0">
+            <a:spAutoFit/>
+          </a:bodyPr>
+          <a:lstStyle/>
+          <a:p>
+            <a:r>
+              <a:rPr lang="fr-FR" dirty="0"/>
+              <a:t>run </a:t>
+            </a:r>
+            <a:r>
+              <a:rPr lang="fr-FR" dirty="0" err="1"/>
+              <a:t>certbot</a:t>
+            </a:r>
+            <a:r>
+              <a:rPr lang="fr-FR" dirty="0"/>
+              <a:t> 2x per </a:t>
+            </a:r>
+            <a:r>
+              <a:rPr lang="fr-FR" dirty="0" err="1"/>
+              <a:t>day</a:t>
+            </a:r>
+            <a:endParaRPr lang="fr-FR" dirty="0"/>
+          </a:p>
+        </p:txBody>
+      </p:sp>
+      <p:sp>
+        <p:nvSpPr>
+          <p:cNvPr id="79" name="TextBox 78">
+            <a:extLst>
+              <a:ext uri="{FF2B5EF4-FFF2-40B4-BE49-F238E27FC236}">
+                <a16:creationId xmlns:a16="http://schemas.microsoft.com/office/drawing/2014/main" id="{F376B8AC-D1AD-4CEB-ADBD-DFDA9DFF7FF8}"/>
+              </a:ext>
+            </a:extLst>
+          </p:cNvPr>
+          <p:cNvSpPr txBox="1"/>
+          <p:nvPr/>
+        </p:nvSpPr>
+        <p:spPr>
+          <a:xfrm>
+            <a:off x="6732493" y="6100483"/>
+            <a:ext cx="4547207" cy="369332"/>
+          </a:xfrm>
+          <a:prstGeom prst="rect">
+            <a:avLst/>
+          </a:prstGeom>
+          <a:noFill/>
+        </p:spPr>
+        <p:txBody>
+          <a:bodyPr wrap="none" rtlCol="0">
+            <a:spAutoFit/>
+          </a:bodyPr>
+          <a:lstStyle/>
+          <a:p>
+            <a:r>
+              <a:rPr lang="fr-FR" dirty="0" err="1"/>
+              <a:t>cerbot</a:t>
+            </a:r>
+            <a:r>
+              <a:rPr lang="fr-FR" dirty="0"/>
+              <a:t> </a:t>
+            </a:r>
+            <a:r>
+              <a:rPr lang="fr-FR" dirty="0" err="1"/>
+              <a:t>create</a:t>
+            </a:r>
+            <a:r>
+              <a:rPr lang="fr-FR" dirty="0"/>
+              <a:t> and </a:t>
+            </a:r>
+            <a:r>
+              <a:rPr lang="fr-FR" dirty="0" err="1"/>
+              <a:t>renew</a:t>
+            </a:r>
+            <a:r>
+              <a:rPr lang="fr-FR" dirty="0"/>
+              <a:t> </a:t>
+            </a:r>
+            <a:r>
+              <a:rPr lang="fr-FR" dirty="0" err="1"/>
+              <a:t>certificates</a:t>
+            </a:r>
+            <a:r>
+              <a:rPr lang="fr-FR" dirty="0"/>
+              <a:t> for HTTPS</a:t>
+            </a:r>
+          </a:p>
+        </p:txBody>
+      </p:sp>
+      <p:sp>
+        <p:nvSpPr>
+          <p:cNvPr id="81" name="Flowchart: Document 80">
+            <a:extLst>
+              <a:ext uri="{FF2B5EF4-FFF2-40B4-BE49-F238E27FC236}">
+                <a16:creationId xmlns:a16="http://schemas.microsoft.com/office/drawing/2014/main" id="{2D578313-E57B-411C-BEA8-A8A3AF1F95FB}"/>
+              </a:ext>
+            </a:extLst>
+          </p:cNvPr>
+          <p:cNvSpPr/>
+          <p:nvPr/>
+        </p:nvSpPr>
+        <p:spPr>
+          <a:xfrm>
+            <a:off x="8570784" y="1692116"/>
+            <a:ext cx="1271937" cy="847160"/>
+          </a:xfrm>
+          <a:prstGeom prst="flowChartDocument">
+            <a:avLst/>
+          </a:prstGeom>
+        </p:spPr>
+        <p:style>
+          <a:lnRef idx="2">
+            <a:schemeClr val="accent1"/>
+          </a:lnRef>
+          <a:fillRef idx="1">
+            <a:schemeClr val="lt1"/>
+          </a:fillRef>
+          <a:effectRef idx="0">
+            <a:schemeClr val="accent1"/>
+          </a:effectRef>
+          <a:fontRef idx="minor">
+            <a:schemeClr val="dk1"/>
+          </a:fontRef>
+        </p:style>
+        <p:txBody>
+          <a:bodyPr rtlCol="0" anchor="ctr"/>
+          <a:lstStyle/>
+          <a:p>
+            <a:pPr algn="ctr"/>
+            <a:r>
+              <a:rPr lang="fr-FR" dirty="0"/>
+              <a:t>Certificates</a:t>
+            </a:r>
+          </a:p>
+        </p:txBody>
+      </p:sp>
+      <p:sp>
+        <p:nvSpPr>
+          <p:cNvPr id="87" name="Flowchart: Document 86">
+            <a:extLst>
+              <a:ext uri="{FF2B5EF4-FFF2-40B4-BE49-F238E27FC236}">
+                <a16:creationId xmlns:a16="http://schemas.microsoft.com/office/drawing/2014/main" id="{D0E7EC7E-629E-4814-B651-01BA99A4A601}"/>
+              </a:ext>
+            </a:extLst>
+          </p:cNvPr>
+          <p:cNvSpPr/>
+          <p:nvPr/>
+        </p:nvSpPr>
+        <p:spPr>
+          <a:xfrm>
+            <a:off x="4103593" y="3888462"/>
+            <a:ext cx="1676400" cy="782150"/>
+          </a:xfrm>
+          <a:prstGeom prst="flowChartDocument">
+            <a:avLst/>
+          </a:prstGeom>
+        </p:spPr>
+        <p:style>
+          <a:lnRef idx="2">
+            <a:schemeClr val="accent1"/>
+          </a:lnRef>
+          <a:fillRef idx="1">
+            <a:schemeClr val="lt1"/>
+          </a:fillRef>
+          <a:effectRef idx="0">
+            <a:schemeClr val="accent1"/>
+          </a:effectRef>
+          <a:fontRef idx="minor">
+            <a:schemeClr val="dk1"/>
+          </a:fontRef>
+        </p:style>
+        <p:txBody>
+          <a:bodyPr rtlCol="0" anchor="ctr"/>
+          <a:lstStyle/>
+          <a:p>
+            <a:pPr algn="ctr"/>
+            <a:r>
+              <a:rPr lang="fr-FR" dirty="0" err="1"/>
+              <a:t>nginx.conf</a:t>
+            </a:r>
+            <a:endParaRPr lang="fr-FR" dirty="0"/>
+          </a:p>
+          <a:p>
+            <a:pPr algn="ctr"/>
+            <a:r>
+              <a:rPr lang="fr-FR" dirty="0"/>
+              <a:t>(site-</a:t>
+            </a:r>
+            <a:r>
+              <a:rPr lang="fr-FR" dirty="0" err="1"/>
+              <a:t>enabled</a:t>
+            </a:r>
+            <a:r>
+              <a:rPr lang="fr-FR" dirty="0"/>
+              <a:t>)</a:t>
+            </a:r>
+          </a:p>
+        </p:txBody>
+      </p:sp>
+      <p:sp>
+        <p:nvSpPr>
+          <p:cNvPr id="90" name="TextBox 89">
+            <a:extLst>
+              <a:ext uri="{FF2B5EF4-FFF2-40B4-BE49-F238E27FC236}">
+                <a16:creationId xmlns:a16="http://schemas.microsoft.com/office/drawing/2014/main" id="{83A4A520-2E50-488E-86B5-0B703BF3987A}"/>
+              </a:ext>
+            </a:extLst>
+          </p:cNvPr>
+          <p:cNvSpPr txBox="1"/>
+          <p:nvPr/>
+        </p:nvSpPr>
+        <p:spPr>
+          <a:xfrm>
+            <a:off x="3459380" y="682445"/>
+            <a:ext cx="3139642" cy="369332"/>
+          </a:xfrm>
+          <a:prstGeom prst="rect">
+            <a:avLst/>
+          </a:prstGeom>
+          <a:noFill/>
+        </p:spPr>
+        <p:txBody>
+          <a:bodyPr wrap="none" rtlCol="0">
+            <a:spAutoFit/>
+          </a:bodyPr>
+          <a:lstStyle/>
+          <a:p>
+            <a:r>
+              <a:rPr lang="fr-FR" dirty="0"/>
+              <a:t>reverse proxy (port 80 and 443)</a:t>
+            </a:r>
+          </a:p>
+        </p:txBody>
+      </p:sp>
+      <p:cxnSp>
+        <p:nvCxnSpPr>
+          <p:cNvPr id="97" name="Connector: Elbow 96">
+            <a:extLst>
+              <a:ext uri="{FF2B5EF4-FFF2-40B4-BE49-F238E27FC236}">
+                <a16:creationId xmlns:a16="http://schemas.microsoft.com/office/drawing/2014/main" id="{8778D70A-AC12-4FDF-86CC-7F6495D8F352}"/>
+              </a:ext>
+            </a:extLst>
+          </p:cNvPr>
+          <p:cNvCxnSpPr>
+            <a:cxnSpLocks/>
+            <a:stCxn id="6" idx="0"/>
+            <a:endCxn id="87" idx="3"/>
+          </p:cNvCxnSpPr>
+          <p:nvPr/>
+        </p:nvCxnSpPr>
+        <p:spPr>
+          <a:xfrm rot="16200000" flipV="1">
+            <a:off x="7318007" y="2741523"/>
+            <a:ext cx="350734" cy="3426761"/>
+          </a:xfrm>
+          <a:prstGeom prst="bentConnector2">
+            <a:avLst/>
+          </a:prstGeom>
+          <a:ln w="76200">
+            <a:solidFill>
+              <a:schemeClr val="accent1"/>
+            </a:solidFill>
+            <a:tailEnd type="triangle"/>
+          </a:ln>
+        </p:spPr>
+        <p:style>
+          <a:lnRef idx="1">
+            <a:schemeClr val="accent1"/>
+          </a:lnRef>
+          <a:fillRef idx="0">
+            <a:schemeClr val="accent1"/>
+          </a:fillRef>
+          <a:effectRef idx="0">
+            <a:schemeClr val="accent1"/>
+          </a:effectRef>
+          <a:fontRef idx="minor">
+            <a:schemeClr val="tx1"/>
+          </a:fontRef>
+        </p:style>
+      </p:cxnSp>
+    </p:spTree>
+    <p:extLst>
+      <p:ext uri="{BB962C8B-B14F-4D97-AF65-F5344CB8AC3E}">
+        <p14:creationId xmlns:p14="http://schemas.microsoft.com/office/powerpoint/2010/main" val="2197300764"/>
+      </p:ext>
+    </p:extLst>
+  </p:cSld>
+  <p:clrMapOvr>
+    <a:masterClrMapping/>
+  </p:clrMapOvr>
+</p:sld>
+</file>
+
+<file path=ppt/slides/slide28.xml><?xml version="1.0" encoding="utf-8"?>
+<p:sld xmlns:a="http://schemas.openxmlformats.org/drawingml/2006/main" xmlns:r="http://schemas.openxmlformats.org/officeDocument/2006/relationships" xmlns:p="http://schemas.openxmlformats.org/presentationml/2006/main">
+  <p:cSld>
+    <p:spTree>
+      <p:nvGrpSpPr>
+        <p:cNvPr id="1" name=""/>
+        <p:cNvGrpSpPr/>
+        <p:nvPr/>
+      </p:nvGrpSpPr>
+      <p:grpSpPr>
+        <a:xfrm>
+          <a:off x="0" y="0"/>
+          <a:ext cx="0" cy="0"/>
+          <a:chOff x="0" y="0"/>
+          <a:chExt cx="0" cy="0"/>
+        </a:xfrm>
+      </p:grpSpPr>
+      <p:sp>
+        <p:nvSpPr>
+          <p:cNvPr id="5" name="Flowchart: Magnetic Disk 4">
+            <a:extLst>
+              <a:ext uri="{FF2B5EF4-FFF2-40B4-BE49-F238E27FC236}">
+                <a16:creationId xmlns:a16="http://schemas.microsoft.com/office/drawing/2014/main" id="{894C7DCD-CA65-43D7-9496-1E205BBFC50E}"/>
+              </a:ext>
+            </a:extLst>
+          </p:cNvPr>
+          <p:cNvSpPr/>
+          <p:nvPr/>
+        </p:nvSpPr>
+        <p:spPr>
+          <a:xfrm>
+            <a:off x="9220198" y="1973381"/>
+            <a:ext cx="2142564" cy="1779494"/>
+          </a:xfrm>
+          <a:prstGeom prst="flowChartMagneticDisk">
+            <a:avLst/>
+          </a:prstGeom>
+        </p:spPr>
+        <p:style>
+          <a:lnRef idx="2">
+            <a:schemeClr val="accent4">
+              <a:shade val="50000"/>
+            </a:schemeClr>
+          </a:lnRef>
+          <a:fillRef idx="1">
+            <a:schemeClr val="accent4"/>
+          </a:fillRef>
+          <a:effectRef idx="0">
+            <a:schemeClr val="accent4"/>
+          </a:effectRef>
+          <a:fontRef idx="minor">
+            <a:schemeClr val="lt1"/>
+          </a:fontRef>
+        </p:style>
+        <p:txBody>
+          <a:bodyPr rtlCol="0" anchor="ctr"/>
+          <a:lstStyle/>
+          <a:p>
+            <a:pPr algn="ctr"/>
+            <a:r>
+              <a:rPr lang="fr-FR" dirty="0"/>
+              <a:t>MongoDB</a:t>
+            </a:r>
+          </a:p>
+        </p:txBody>
+      </p:sp>
+      <p:sp>
+        <p:nvSpPr>
+          <p:cNvPr id="6" name="Rectangle 5">
+            <a:extLst>
+              <a:ext uri="{FF2B5EF4-FFF2-40B4-BE49-F238E27FC236}">
+                <a16:creationId xmlns:a16="http://schemas.microsoft.com/office/drawing/2014/main" id="{9C747266-8DDC-4989-BCF3-D49803BC5A23}"/>
+              </a:ext>
+            </a:extLst>
+          </p:cNvPr>
+          <p:cNvSpPr/>
+          <p:nvPr/>
+        </p:nvSpPr>
+        <p:spPr>
+          <a:xfrm>
+            <a:off x="5384989" y="5963765"/>
+            <a:ext cx="1703292" cy="596162"/>
+          </a:xfrm>
+          <a:prstGeom prst="rect">
+            <a:avLst/>
+          </a:prstGeom>
+        </p:spPr>
+        <p:style>
+          <a:lnRef idx="2">
+            <a:schemeClr val="accent2">
+              <a:shade val="50000"/>
+            </a:schemeClr>
+          </a:lnRef>
+          <a:fillRef idx="1">
+            <a:schemeClr val="accent2"/>
+          </a:fillRef>
+          <a:effectRef idx="0">
+            <a:schemeClr val="accent2"/>
+          </a:effectRef>
+          <a:fontRef idx="minor">
+            <a:schemeClr val="lt1"/>
+          </a:fontRef>
+        </p:style>
+        <p:txBody>
+          <a:bodyPr rtlCol="0" anchor="ctr"/>
+          <a:lstStyle/>
+          <a:p>
+            <a:pPr algn="ctr"/>
+            <a:r>
+              <a:rPr lang="fr-FR" dirty="0"/>
+              <a:t>pm2</a:t>
+            </a:r>
+          </a:p>
+        </p:txBody>
+      </p:sp>
+      <p:sp>
+        <p:nvSpPr>
+          <p:cNvPr id="7" name="Rectangle 6">
+            <a:extLst>
+              <a:ext uri="{FF2B5EF4-FFF2-40B4-BE49-F238E27FC236}">
+                <a16:creationId xmlns:a16="http://schemas.microsoft.com/office/drawing/2014/main" id="{BF56A15A-23DA-45CC-8EC9-16801700B449}"/>
+              </a:ext>
+            </a:extLst>
+          </p:cNvPr>
+          <p:cNvSpPr/>
+          <p:nvPr/>
+        </p:nvSpPr>
+        <p:spPr>
+          <a:xfrm>
+            <a:off x="9421903" y="5813611"/>
+            <a:ext cx="1739153" cy="896471"/>
+          </a:xfrm>
+          <a:prstGeom prst="rect">
+            <a:avLst/>
+          </a:prstGeom>
+        </p:spPr>
+        <p:style>
+          <a:lnRef idx="2">
+            <a:schemeClr val="dk1">
+              <a:shade val="50000"/>
+            </a:schemeClr>
+          </a:lnRef>
+          <a:fillRef idx="1">
+            <a:schemeClr val="dk1"/>
+          </a:fillRef>
+          <a:effectRef idx="0">
+            <a:schemeClr val="dk1"/>
+          </a:effectRef>
+          <a:fontRef idx="minor">
+            <a:schemeClr val="lt1"/>
+          </a:fontRef>
+        </p:style>
+        <p:txBody>
+          <a:bodyPr rtlCol="0" anchor="ctr"/>
+          <a:lstStyle/>
+          <a:p>
+            <a:pPr algn="ctr"/>
+            <a:r>
+              <a:rPr lang="fr-FR" dirty="0" err="1"/>
+              <a:t>systemd</a:t>
+            </a:r>
+            <a:endParaRPr lang="fr-FR" dirty="0"/>
+          </a:p>
+        </p:txBody>
+      </p:sp>
+      <p:cxnSp>
+        <p:nvCxnSpPr>
+          <p:cNvPr id="9" name="Straight Arrow Connector 8">
+            <a:extLst>
+              <a:ext uri="{FF2B5EF4-FFF2-40B4-BE49-F238E27FC236}">
+                <a16:creationId xmlns:a16="http://schemas.microsoft.com/office/drawing/2014/main" id="{668ECAC0-9AE9-431A-9D4B-1A21A92727C5}"/>
+              </a:ext>
+            </a:extLst>
+          </p:cNvPr>
+          <p:cNvCxnSpPr>
+            <a:cxnSpLocks/>
+            <a:stCxn id="6" idx="0"/>
+            <a:endCxn id="23" idx="2"/>
+          </p:cNvCxnSpPr>
+          <p:nvPr/>
+        </p:nvCxnSpPr>
+        <p:spPr>
+          <a:xfrm flipV="1">
+            <a:off x="6236635" y="4143954"/>
+            <a:ext cx="0" cy="1819811"/>
+          </a:xfrm>
+          <a:prstGeom prst="straightConnector1">
+            <a:avLst/>
+          </a:prstGeom>
+          <a:ln w="76200">
+            <a:solidFill>
+              <a:schemeClr val="accent1"/>
+            </a:solidFill>
+            <a:tailEnd type="triangle"/>
+          </a:ln>
+        </p:spPr>
+        <p:style>
+          <a:lnRef idx="1">
+            <a:schemeClr val="accent1"/>
+          </a:lnRef>
+          <a:fillRef idx="0">
+            <a:schemeClr val="accent1"/>
+          </a:fillRef>
+          <a:effectRef idx="0">
+            <a:schemeClr val="accent1"/>
+          </a:effectRef>
+          <a:fontRef idx="minor">
+            <a:schemeClr val="tx1"/>
+          </a:fontRef>
+        </p:style>
+      </p:cxnSp>
+      <p:cxnSp>
+        <p:nvCxnSpPr>
+          <p:cNvPr id="12" name="Straight Arrow Connector 11">
+            <a:extLst>
+              <a:ext uri="{FF2B5EF4-FFF2-40B4-BE49-F238E27FC236}">
+                <a16:creationId xmlns:a16="http://schemas.microsoft.com/office/drawing/2014/main" id="{745E295B-D555-40FF-A1F1-6502BEACB5E5}"/>
+              </a:ext>
+            </a:extLst>
+          </p:cNvPr>
+          <p:cNvCxnSpPr>
+            <a:stCxn id="7" idx="0"/>
+            <a:endCxn id="5" idx="3"/>
+          </p:cNvCxnSpPr>
+          <p:nvPr/>
+        </p:nvCxnSpPr>
+        <p:spPr>
+          <a:xfrm flipV="1">
+            <a:off x="10291480" y="3752875"/>
+            <a:ext cx="0" cy="2060736"/>
+          </a:xfrm>
+          <a:prstGeom prst="straightConnector1">
+            <a:avLst/>
+          </a:prstGeom>
+          <a:ln w="76200">
+            <a:solidFill>
+              <a:schemeClr val="accent1"/>
+            </a:solidFill>
+            <a:tailEnd type="triangle"/>
+          </a:ln>
+        </p:spPr>
+        <p:style>
+          <a:lnRef idx="1">
+            <a:schemeClr val="accent1"/>
+          </a:lnRef>
+          <a:fillRef idx="0">
+            <a:schemeClr val="accent1"/>
+          </a:fillRef>
+          <a:effectRef idx="0">
+            <a:schemeClr val="accent1"/>
+          </a:effectRef>
+          <a:fontRef idx="minor">
+            <a:schemeClr val="tx1"/>
+          </a:fontRef>
+        </p:style>
+      </p:cxnSp>
+      <p:cxnSp>
+        <p:nvCxnSpPr>
+          <p:cNvPr id="15" name="Straight Arrow Connector 14">
+            <a:extLst>
+              <a:ext uri="{FF2B5EF4-FFF2-40B4-BE49-F238E27FC236}">
+                <a16:creationId xmlns:a16="http://schemas.microsoft.com/office/drawing/2014/main" id="{29CF5C16-082D-4EEC-B22A-DB88422AB4B3}"/>
+              </a:ext>
+            </a:extLst>
+          </p:cNvPr>
+          <p:cNvCxnSpPr>
+            <a:cxnSpLocks/>
+            <a:stCxn id="7" idx="1"/>
+            <a:endCxn id="6" idx="3"/>
+          </p:cNvCxnSpPr>
+          <p:nvPr/>
+        </p:nvCxnSpPr>
+        <p:spPr>
+          <a:xfrm flipH="1" flipV="1">
+            <a:off x="7088281" y="6261846"/>
+            <a:ext cx="2333622" cy="1"/>
+          </a:xfrm>
+          <a:prstGeom prst="straightConnector1">
+            <a:avLst/>
+          </a:prstGeom>
+          <a:ln w="76200">
+            <a:solidFill>
+              <a:schemeClr val="accent1"/>
+            </a:solidFill>
+            <a:tailEnd type="triangle"/>
+          </a:ln>
+        </p:spPr>
+        <p:style>
+          <a:lnRef idx="1">
+            <a:schemeClr val="accent1"/>
+          </a:lnRef>
+          <a:fillRef idx="0">
+            <a:schemeClr val="accent1"/>
+          </a:fillRef>
+          <a:effectRef idx="0">
+            <a:schemeClr val="accent1"/>
+          </a:effectRef>
+          <a:fontRef idx="minor">
+            <a:schemeClr val="tx1"/>
+          </a:fontRef>
+        </p:style>
+      </p:cxnSp>
+      <p:sp>
+        <p:nvSpPr>
+          <p:cNvPr id="23" name="Rectangle 22">
+            <a:extLst>
+              <a:ext uri="{FF2B5EF4-FFF2-40B4-BE49-F238E27FC236}">
+                <a16:creationId xmlns:a16="http://schemas.microsoft.com/office/drawing/2014/main" id="{B5587BEE-1C2F-42E7-93A2-706FD8FD8913}"/>
+              </a:ext>
+            </a:extLst>
+          </p:cNvPr>
+          <p:cNvSpPr/>
+          <p:nvPr/>
+        </p:nvSpPr>
+        <p:spPr>
+          <a:xfrm>
+            <a:off x="4764745" y="1582302"/>
+            <a:ext cx="2943779" cy="2561652"/>
+          </a:xfrm>
+          <a:prstGeom prst="rect">
+            <a:avLst/>
+          </a:prstGeom>
+        </p:spPr>
+        <p:style>
+          <a:lnRef idx="2">
+            <a:schemeClr val="accent1">
+              <a:shade val="50000"/>
+            </a:schemeClr>
+          </a:lnRef>
+          <a:fillRef idx="1">
+            <a:schemeClr val="accent1"/>
+          </a:fillRef>
+          <a:effectRef idx="0">
+            <a:schemeClr val="accent1"/>
+          </a:effectRef>
+          <a:fontRef idx="minor">
+            <a:schemeClr val="lt1"/>
+          </a:fontRef>
+        </p:style>
+        <p:txBody>
+          <a:bodyPr rtlCol="0" anchor="ctr"/>
+          <a:lstStyle/>
+          <a:p>
+            <a:pPr algn="ctr"/>
+            <a:r>
+              <a:rPr lang="fr-FR" dirty="0" err="1"/>
+              <a:t>Back-End</a:t>
+            </a:r>
+            <a:r>
+              <a:rPr lang="fr-FR" dirty="0"/>
+              <a:t> app</a:t>
+            </a:r>
+          </a:p>
+        </p:txBody>
+      </p:sp>
+      <p:cxnSp>
+        <p:nvCxnSpPr>
+          <p:cNvPr id="28" name="Straight Arrow Connector 27">
+            <a:extLst>
+              <a:ext uri="{FF2B5EF4-FFF2-40B4-BE49-F238E27FC236}">
+                <a16:creationId xmlns:a16="http://schemas.microsoft.com/office/drawing/2014/main" id="{73742A58-EF88-41DA-ADB3-684BFBAA17A6}"/>
+              </a:ext>
+            </a:extLst>
+          </p:cNvPr>
+          <p:cNvCxnSpPr>
+            <a:cxnSpLocks/>
+            <a:stCxn id="23" idx="3"/>
+            <a:endCxn id="5" idx="2"/>
+          </p:cNvCxnSpPr>
+          <p:nvPr/>
+        </p:nvCxnSpPr>
+        <p:spPr>
+          <a:xfrm>
+            <a:off x="7708524" y="2863128"/>
+            <a:ext cx="1511674" cy="0"/>
+          </a:xfrm>
+          <a:prstGeom prst="straightConnector1">
+            <a:avLst/>
+          </a:prstGeom>
+          <a:ln w="76200">
+            <a:solidFill>
+              <a:schemeClr val="accent1"/>
+            </a:solidFill>
+            <a:tailEnd type="triangle"/>
+          </a:ln>
+        </p:spPr>
+        <p:style>
+          <a:lnRef idx="1">
+            <a:schemeClr val="accent1"/>
+          </a:lnRef>
+          <a:fillRef idx="0">
+            <a:schemeClr val="accent1"/>
+          </a:fillRef>
+          <a:effectRef idx="0">
+            <a:schemeClr val="accent1"/>
+          </a:effectRef>
+          <a:fontRef idx="minor">
+            <a:schemeClr val="tx1"/>
+          </a:fontRef>
+        </p:style>
+      </p:cxnSp>
+      <p:sp>
+        <p:nvSpPr>
+          <p:cNvPr id="31" name="Rectangle 30">
+            <a:extLst>
+              <a:ext uri="{FF2B5EF4-FFF2-40B4-BE49-F238E27FC236}">
+                <a16:creationId xmlns:a16="http://schemas.microsoft.com/office/drawing/2014/main" id="{EC3D0EBB-65C1-4010-A218-E7E73FA189FF}"/>
+              </a:ext>
+            </a:extLst>
+          </p:cNvPr>
+          <p:cNvSpPr/>
+          <p:nvPr/>
+        </p:nvSpPr>
+        <p:spPr>
+          <a:xfrm>
+            <a:off x="5896254" y="3395404"/>
+            <a:ext cx="1661272" cy="591674"/>
+          </a:xfrm>
+          <a:prstGeom prst="rect">
+            <a:avLst/>
+          </a:prstGeom>
+        </p:spPr>
+        <p:style>
+          <a:lnRef idx="2">
+            <a:schemeClr val="accent6">
+              <a:shade val="50000"/>
+            </a:schemeClr>
+          </a:lnRef>
+          <a:fillRef idx="1">
+            <a:schemeClr val="accent6"/>
+          </a:fillRef>
+          <a:effectRef idx="0">
+            <a:schemeClr val="accent6"/>
+          </a:effectRef>
+          <a:fontRef idx="minor">
+            <a:schemeClr val="lt1"/>
+          </a:fontRef>
+        </p:style>
+        <p:txBody>
+          <a:bodyPr rtlCol="0" anchor="ctr"/>
+          <a:lstStyle/>
+          <a:p>
+            <a:pPr algn="ctr"/>
+            <a:r>
+              <a:rPr lang="fr-FR" dirty="0" err="1"/>
+              <a:t>Front-End</a:t>
+            </a:r>
+            <a:r>
+              <a:rPr lang="fr-FR" dirty="0"/>
+              <a:t> app</a:t>
+            </a:r>
+          </a:p>
+        </p:txBody>
+      </p:sp>
+      <p:sp>
+        <p:nvSpPr>
+          <p:cNvPr id="58" name="Rectangle 57">
+            <a:extLst>
+              <a:ext uri="{FF2B5EF4-FFF2-40B4-BE49-F238E27FC236}">
+                <a16:creationId xmlns:a16="http://schemas.microsoft.com/office/drawing/2014/main" id="{3CBA141C-9788-4130-B92C-74FE92D9BAC9}"/>
+              </a:ext>
+            </a:extLst>
+          </p:cNvPr>
+          <p:cNvSpPr/>
+          <p:nvPr/>
+        </p:nvSpPr>
+        <p:spPr>
+          <a:xfrm>
+            <a:off x="1939742" y="2343180"/>
+            <a:ext cx="1471889" cy="1039896"/>
+          </a:xfrm>
+          <a:prstGeom prst="rect">
+            <a:avLst/>
+          </a:prstGeom>
+        </p:spPr>
+        <p:style>
+          <a:lnRef idx="2">
+            <a:schemeClr val="accent1"/>
+          </a:lnRef>
+          <a:fillRef idx="1">
+            <a:schemeClr val="lt1"/>
+          </a:fillRef>
+          <a:effectRef idx="0">
+            <a:schemeClr val="accent1"/>
+          </a:effectRef>
+          <a:fontRef idx="minor">
+            <a:schemeClr val="dk1"/>
+          </a:fontRef>
+        </p:style>
+        <p:txBody>
+          <a:bodyPr rtlCol="0" anchor="ctr"/>
+          <a:lstStyle/>
+          <a:p>
+            <a:pPr algn="ctr"/>
+            <a:r>
+              <a:rPr lang="fr-FR" dirty="0" err="1"/>
+              <a:t>nginx</a:t>
+            </a:r>
+            <a:endParaRPr lang="fr-FR" dirty="0"/>
+          </a:p>
+        </p:txBody>
+      </p:sp>
+      <p:cxnSp>
+        <p:nvCxnSpPr>
+          <p:cNvPr id="60" name="Straight Arrow Connector 59">
+            <a:extLst>
+              <a:ext uri="{FF2B5EF4-FFF2-40B4-BE49-F238E27FC236}">
+                <a16:creationId xmlns:a16="http://schemas.microsoft.com/office/drawing/2014/main" id="{E44A3624-8EE8-4875-8A2F-3EFDD1A70E29}"/>
+              </a:ext>
+            </a:extLst>
+          </p:cNvPr>
+          <p:cNvCxnSpPr>
+            <a:cxnSpLocks/>
+            <a:endCxn id="58" idx="1"/>
+          </p:cNvCxnSpPr>
+          <p:nvPr/>
+        </p:nvCxnSpPr>
+        <p:spPr>
+          <a:xfrm>
+            <a:off x="457199" y="2863128"/>
+            <a:ext cx="1482543" cy="0"/>
+          </a:xfrm>
+          <a:prstGeom prst="straightConnector1">
+            <a:avLst/>
+          </a:prstGeom>
+          <a:ln w="76200">
+            <a:solidFill>
+              <a:schemeClr val="accent1"/>
+            </a:solidFill>
+            <a:tailEnd type="triangle"/>
+          </a:ln>
+        </p:spPr>
+        <p:style>
+          <a:lnRef idx="1">
+            <a:schemeClr val="accent1"/>
+          </a:lnRef>
+          <a:fillRef idx="0">
+            <a:schemeClr val="accent1"/>
+          </a:fillRef>
+          <a:effectRef idx="0">
+            <a:schemeClr val="accent1"/>
+          </a:effectRef>
+          <a:fontRef idx="minor">
+            <a:schemeClr val="tx1"/>
+          </a:fontRef>
+        </p:style>
+      </p:cxnSp>
+      <p:cxnSp>
+        <p:nvCxnSpPr>
+          <p:cNvPr id="63" name="Straight Arrow Connector 62">
+            <a:extLst>
+              <a:ext uri="{FF2B5EF4-FFF2-40B4-BE49-F238E27FC236}">
+                <a16:creationId xmlns:a16="http://schemas.microsoft.com/office/drawing/2014/main" id="{5F5EDCC0-700B-42D9-B864-26D66EF4CFD9}"/>
+              </a:ext>
+            </a:extLst>
+          </p:cNvPr>
+          <p:cNvCxnSpPr>
+            <a:stCxn id="58" idx="3"/>
+            <a:endCxn id="23" idx="1"/>
+          </p:cNvCxnSpPr>
+          <p:nvPr/>
+        </p:nvCxnSpPr>
+        <p:spPr>
+          <a:xfrm>
+            <a:off x="3411631" y="2863128"/>
+            <a:ext cx="1353114" cy="0"/>
+          </a:xfrm>
+          <a:prstGeom prst="straightConnector1">
+            <a:avLst/>
+          </a:prstGeom>
+          <a:ln w="76200">
+            <a:solidFill>
+              <a:schemeClr val="accent1"/>
+            </a:solidFill>
+            <a:tailEnd type="triangle"/>
+          </a:ln>
+        </p:spPr>
+        <p:style>
+          <a:lnRef idx="1">
+            <a:schemeClr val="accent1"/>
+          </a:lnRef>
+          <a:fillRef idx="0">
+            <a:schemeClr val="accent1"/>
+          </a:fillRef>
+          <a:effectRef idx="0">
+            <a:schemeClr val="accent1"/>
+          </a:effectRef>
+          <a:fontRef idx="minor">
+            <a:schemeClr val="tx1"/>
+          </a:fontRef>
+        </p:style>
+      </p:cxnSp>
+      <p:sp>
+        <p:nvSpPr>
+          <p:cNvPr id="64" name="Rectangle 63">
+            <a:extLst>
+              <a:ext uri="{FF2B5EF4-FFF2-40B4-BE49-F238E27FC236}">
+                <a16:creationId xmlns:a16="http://schemas.microsoft.com/office/drawing/2014/main" id="{8D764B02-45AB-4DA4-AB07-242FA0F444BF}"/>
+              </a:ext>
+            </a:extLst>
+          </p:cNvPr>
+          <p:cNvSpPr/>
+          <p:nvPr/>
+        </p:nvSpPr>
+        <p:spPr>
+          <a:xfrm>
+            <a:off x="5635158" y="428083"/>
+            <a:ext cx="1202953" cy="596163"/>
+          </a:xfrm>
+          <a:prstGeom prst="rect">
+            <a:avLst/>
+          </a:prstGeom>
+        </p:spPr>
+        <p:style>
+          <a:lnRef idx="2">
+            <a:schemeClr val="accent2">
+              <a:shade val="50000"/>
+            </a:schemeClr>
+          </a:lnRef>
+          <a:fillRef idx="1">
+            <a:schemeClr val="accent2"/>
+          </a:fillRef>
+          <a:effectRef idx="0">
+            <a:schemeClr val="accent2"/>
+          </a:effectRef>
+          <a:fontRef idx="minor">
+            <a:schemeClr val="lt1"/>
+          </a:fontRef>
+        </p:style>
+        <p:txBody>
+          <a:bodyPr rtlCol="0" anchor="ctr"/>
+          <a:lstStyle/>
+          <a:p>
+            <a:pPr algn="ctr"/>
+            <a:r>
+              <a:rPr lang="fr-FR" dirty="0" err="1"/>
+              <a:t>npm</a:t>
+            </a:r>
+            <a:r>
+              <a:rPr lang="fr-FR" dirty="0"/>
+              <a:t>/</a:t>
+            </a:r>
+            <a:r>
+              <a:rPr lang="fr-FR" dirty="0" err="1"/>
+              <a:t>node</a:t>
+            </a:r>
+            <a:endParaRPr lang="fr-FR" dirty="0"/>
+          </a:p>
+        </p:txBody>
+      </p:sp>
+      <p:cxnSp>
+        <p:nvCxnSpPr>
+          <p:cNvPr id="72" name="Straight Arrow Connector 71">
+            <a:extLst>
+              <a:ext uri="{FF2B5EF4-FFF2-40B4-BE49-F238E27FC236}">
+                <a16:creationId xmlns:a16="http://schemas.microsoft.com/office/drawing/2014/main" id="{E09683CD-E06F-4F1C-8F74-DF253686A6CD}"/>
+              </a:ext>
+            </a:extLst>
+          </p:cNvPr>
+          <p:cNvCxnSpPr>
+            <a:cxnSpLocks/>
+            <a:stCxn id="64" idx="2"/>
+            <a:endCxn id="23" idx="0"/>
+          </p:cNvCxnSpPr>
+          <p:nvPr/>
+        </p:nvCxnSpPr>
+        <p:spPr>
+          <a:xfrm>
+            <a:off x="6236635" y="1024246"/>
+            <a:ext cx="0" cy="558056"/>
+          </a:xfrm>
+          <a:prstGeom prst="straightConnector1">
+            <a:avLst/>
+          </a:prstGeom>
+          <a:ln w="76200">
+            <a:solidFill>
+              <a:schemeClr val="accent1"/>
+            </a:solidFill>
+            <a:tailEnd type="triangle"/>
+          </a:ln>
+        </p:spPr>
+        <p:style>
+          <a:lnRef idx="1">
+            <a:schemeClr val="accent1"/>
+          </a:lnRef>
+          <a:fillRef idx="0">
+            <a:schemeClr val="accent1"/>
+          </a:fillRef>
+          <a:effectRef idx="0">
+            <a:schemeClr val="accent1"/>
+          </a:effectRef>
+          <a:fontRef idx="minor">
+            <a:schemeClr val="tx1"/>
+          </a:fontRef>
+        </p:style>
+      </p:cxnSp>
+      <p:sp>
+        <p:nvSpPr>
+          <p:cNvPr id="74" name="Rectangle 73">
+            <a:extLst>
+              <a:ext uri="{FF2B5EF4-FFF2-40B4-BE49-F238E27FC236}">
+                <a16:creationId xmlns:a16="http://schemas.microsoft.com/office/drawing/2014/main" id="{7E74B075-CA77-4668-8B1F-5DDCDD132C08}"/>
+              </a:ext>
+            </a:extLst>
+          </p:cNvPr>
+          <p:cNvSpPr/>
+          <p:nvPr/>
+        </p:nvSpPr>
+        <p:spPr>
+          <a:xfrm>
+            <a:off x="4135530" y="428084"/>
+            <a:ext cx="885265" cy="596163"/>
+          </a:xfrm>
+          <a:prstGeom prst="rect">
+            <a:avLst/>
+          </a:prstGeom>
+        </p:spPr>
+        <p:style>
+          <a:lnRef idx="2">
+            <a:schemeClr val="accent3">
+              <a:shade val="50000"/>
+            </a:schemeClr>
+          </a:lnRef>
+          <a:fillRef idx="1">
+            <a:schemeClr val="accent3"/>
+          </a:fillRef>
+          <a:effectRef idx="0">
+            <a:schemeClr val="accent3"/>
+          </a:effectRef>
+          <a:fontRef idx="minor">
+            <a:schemeClr val="lt1"/>
+          </a:fontRef>
+        </p:style>
+        <p:txBody>
+          <a:bodyPr rtlCol="0" anchor="ctr"/>
+          <a:lstStyle/>
+          <a:p>
+            <a:pPr algn="ctr"/>
+            <a:r>
+              <a:rPr lang="fr-FR" dirty="0"/>
+              <a:t>git</a:t>
+            </a:r>
+          </a:p>
+        </p:txBody>
+      </p:sp>
+      <p:cxnSp>
+        <p:nvCxnSpPr>
+          <p:cNvPr id="76" name="Straight Arrow Connector 75">
+            <a:extLst>
+              <a:ext uri="{FF2B5EF4-FFF2-40B4-BE49-F238E27FC236}">
+                <a16:creationId xmlns:a16="http://schemas.microsoft.com/office/drawing/2014/main" id="{7D42254C-ECD6-443E-A960-7026E89824B9}"/>
+              </a:ext>
+            </a:extLst>
+          </p:cNvPr>
+          <p:cNvCxnSpPr>
+            <a:cxnSpLocks/>
+            <a:stCxn id="74" idx="3"/>
+            <a:endCxn id="64" idx="1"/>
+          </p:cNvCxnSpPr>
+          <p:nvPr/>
+        </p:nvCxnSpPr>
+        <p:spPr>
+          <a:xfrm flipV="1">
+            <a:off x="5020795" y="726165"/>
+            <a:ext cx="614363" cy="1"/>
+          </a:xfrm>
+          <a:prstGeom prst="straightConnector1">
+            <a:avLst/>
+          </a:prstGeom>
+          <a:ln w="76200">
+            <a:solidFill>
+              <a:schemeClr val="accent1"/>
+            </a:solidFill>
+            <a:tailEnd type="triangle"/>
+          </a:ln>
+        </p:spPr>
+        <p:style>
+          <a:lnRef idx="1">
+            <a:schemeClr val="accent1"/>
+          </a:lnRef>
+          <a:fillRef idx="0">
+            <a:schemeClr val="accent1"/>
+          </a:fillRef>
+          <a:effectRef idx="0">
+            <a:schemeClr val="accent1"/>
+          </a:effectRef>
+          <a:fontRef idx="minor">
+            <a:schemeClr val="tx1"/>
+          </a:fontRef>
+        </p:style>
+      </p:cxnSp>
+    </p:spTree>
+    <p:extLst>
+      <p:ext uri="{BB962C8B-B14F-4D97-AF65-F5344CB8AC3E}">
+        <p14:creationId xmlns:p14="http://schemas.microsoft.com/office/powerpoint/2010/main" val="2866524294"/>
+      </p:ext>
+    </p:extLst>
+  </p:cSld>
+  <p:clrMapOvr>
+    <a:masterClrMapping/>
+  </p:clrMapOvr>
+</p:sld>
+</file>
+
+<file path=ppt/slides/slide29.xml><?xml version="1.0" encoding="utf-8"?>
+<p:sld xmlns:a="http://schemas.openxmlformats.org/drawingml/2006/main" xmlns:r="http://schemas.openxmlformats.org/officeDocument/2006/relationships" xmlns:p="http://schemas.openxmlformats.org/presentationml/2006/main">
+  <p:cSld>
+    <p:spTree>
+      <p:nvGrpSpPr>
+        <p:cNvPr id="1" name=""/>
+        <p:cNvGrpSpPr/>
+        <p:nvPr/>
+      </p:nvGrpSpPr>
+      <p:grpSpPr>
+        <a:xfrm>
+          <a:off x="0" y="0"/>
+          <a:ext cx="0" cy="0"/>
+          <a:chOff x="0" y="0"/>
+          <a:chExt cx="0" cy="0"/>
+        </a:xfrm>
+      </p:grpSpPr>
+      <p:sp>
+        <p:nvSpPr>
+          <p:cNvPr id="2" name="Title 1">
+            <a:extLst>
+              <a:ext uri="{FF2B5EF4-FFF2-40B4-BE49-F238E27FC236}">
                 <a16:creationId xmlns:a16="http://schemas.microsoft.com/office/drawing/2014/main" id="{02109A0C-AFFD-406D-90FA-C9E147A26F14}"/>
               </a:ext>
             </a:extLst>

</xml_diff>